<commit_message>
updating figures for submission
</commit_message>
<xml_diff>
--- a/figure-1/Fig-1.pptx
+++ b/figure-1/Fig-1.pptx
@@ -208,7 +208,7 @@
           <a:p>
             <a:fld id="{4F405BEB-624C-7944-B04F-47802A4A37F3}" type="datetimeFigureOut">
               <a:rPr lang="en-US" smtClean="0"/>
-              <a:t>4/25/23</a:t>
+              <a:t>4/28/23</a:t>
             </a:fld>
             <a:endParaRPr lang="en-US"/>
           </a:p>
@@ -695,7 +695,7 @@
           <a:p>
             <a:fld id="{5AE4C86A-FCC4-8247-A7C0-BE0B89853347}" type="datetimeFigureOut">
               <a:rPr lang="en-US" smtClean="0"/>
-              <a:t>4/25/23</a:t>
+              <a:t>4/28/23</a:t>
             </a:fld>
             <a:endParaRPr lang="en-US"/>
           </a:p>
@@ -866,7 +866,7 @@
           <a:p>
             <a:fld id="{5AE4C86A-FCC4-8247-A7C0-BE0B89853347}" type="datetimeFigureOut">
               <a:rPr lang="en-US" smtClean="0"/>
-              <a:t>4/25/23</a:t>
+              <a:t>4/28/23</a:t>
             </a:fld>
             <a:endParaRPr lang="en-US"/>
           </a:p>
@@ -1046,7 +1046,7 @@
           <a:p>
             <a:fld id="{5AE4C86A-FCC4-8247-A7C0-BE0B89853347}" type="datetimeFigureOut">
               <a:rPr lang="en-US" smtClean="0"/>
-              <a:t>4/25/23</a:t>
+              <a:t>4/28/23</a:t>
             </a:fld>
             <a:endParaRPr lang="en-US"/>
           </a:p>
@@ -1216,7 +1216,7 @@
           <a:p>
             <a:fld id="{5AE4C86A-FCC4-8247-A7C0-BE0B89853347}" type="datetimeFigureOut">
               <a:rPr lang="en-US" smtClean="0"/>
-              <a:t>4/25/23</a:t>
+              <a:t>4/28/23</a:t>
             </a:fld>
             <a:endParaRPr lang="en-US"/>
           </a:p>
@@ -1460,7 +1460,7 @@
           <a:p>
             <a:fld id="{5AE4C86A-FCC4-8247-A7C0-BE0B89853347}" type="datetimeFigureOut">
               <a:rPr lang="en-US" smtClean="0"/>
-              <a:t>4/25/23</a:t>
+              <a:t>4/28/23</a:t>
             </a:fld>
             <a:endParaRPr lang="en-US"/>
           </a:p>
@@ -1692,7 +1692,7 @@
           <a:p>
             <a:fld id="{5AE4C86A-FCC4-8247-A7C0-BE0B89853347}" type="datetimeFigureOut">
               <a:rPr lang="en-US" smtClean="0"/>
-              <a:t>4/25/23</a:t>
+              <a:t>4/28/23</a:t>
             </a:fld>
             <a:endParaRPr lang="en-US"/>
           </a:p>
@@ -2059,7 +2059,7 @@
           <a:p>
             <a:fld id="{5AE4C86A-FCC4-8247-A7C0-BE0B89853347}" type="datetimeFigureOut">
               <a:rPr lang="en-US" smtClean="0"/>
-              <a:t>4/25/23</a:t>
+              <a:t>4/28/23</a:t>
             </a:fld>
             <a:endParaRPr lang="en-US"/>
           </a:p>
@@ -2177,7 +2177,7 @@
           <a:p>
             <a:fld id="{5AE4C86A-FCC4-8247-A7C0-BE0B89853347}" type="datetimeFigureOut">
               <a:rPr lang="en-US" smtClean="0"/>
-              <a:t>4/25/23</a:t>
+              <a:t>4/28/23</a:t>
             </a:fld>
             <a:endParaRPr lang="en-US"/>
           </a:p>
@@ -2272,7 +2272,7 @@
           <a:p>
             <a:fld id="{5AE4C86A-FCC4-8247-A7C0-BE0B89853347}" type="datetimeFigureOut">
               <a:rPr lang="en-US" smtClean="0"/>
-              <a:t>4/25/23</a:t>
+              <a:t>4/28/23</a:t>
             </a:fld>
             <a:endParaRPr lang="en-US"/>
           </a:p>
@@ -2549,7 +2549,7 @@
           <a:p>
             <a:fld id="{5AE4C86A-FCC4-8247-A7C0-BE0B89853347}" type="datetimeFigureOut">
               <a:rPr lang="en-US" smtClean="0"/>
-              <a:t>4/25/23</a:t>
+              <a:t>4/28/23</a:t>
             </a:fld>
             <a:endParaRPr lang="en-US"/>
           </a:p>
@@ -2806,7 +2806,7 @@
           <a:p>
             <a:fld id="{5AE4C86A-FCC4-8247-A7C0-BE0B89853347}" type="datetimeFigureOut">
               <a:rPr lang="en-US" smtClean="0"/>
-              <a:t>4/25/23</a:t>
+              <a:t>4/28/23</a:t>
             </a:fld>
             <a:endParaRPr lang="en-US"/>
           </a:p>
@@ -3019,7 +3019,7 @@
           <a:p>
             <a:fld id="{5AE4C86A-FCC4-8247-A7C0-BE0B89853347}" type="datetimeFigureOut">
               <a:rPr lang="en-US" smtClean="0"/>
-              <a:t>4/25/23</a:t>
+              <a:t>4/28/23</a:t>
             </a:fld>
             <a:endParaRPr lang="en-US"/>
           </a:p>
@@ -4172,9 +4172,9 @@
             <p:grpSpPr>
               <a:xfrm>
                 <a:off x="-26141" y="3482402"/>
-                <a:ext cx="1651050" cy="968680"/>
+                <a:ext cx="1651050" cy="988273"/>
                 <a:chOff x="-469330" y="4041696"/>
-                <a:chExt cx="1651050" cy="968680"/>
+                <a:chExt cx="1651050" cy="988273"/>
               </a:xfrm>
             </p:grpSpPr>
             <p:grpSp>
@@ -4191,9 +4191,9 @@
               </p:nvGrpSpPr>
               <p:grpSpPr>
                 <a:xfrm>
-                  <a:off x="-380302" y="4095976"/>
+                  <a:off x="-380302" y="4115569"/>
                   <a:ext cx="914400" cy="914400"/>
-                  <a:chOff x="-155131" y="889565"/>
+                  <a:chOff x="-155131" y="909158"/>
                   <a:chExt cx="914400" cy="914400"/>
                 </a:xfrm>
               </p:grpSpPr>
@@ -4225,7 +4225,7 @@
                 </p:blipFill>
                 <p:spPr>
                   <a:xfrm>
-                    <a:off x="-155131" y="889565"/>
+                    <a:off x="-155131" y="909158"/>
                     <a:ext cx="914400" cy="914400"/>
                   </a:xfrm>
                   <a:prstGeom prst="rect">
@@ -4247,7 +4247,7 @@
                 </p:nvSpPr>
                 <p:spPr>
                   <a:xfrm>
-                    <a:off x="232952" y="1511828"/>
+                    <a:off x="232952" y="1531421"/>
                     <a:ext cx="136306" cy="130428"/>
                   </a:xfrm>
                   <a:prstGeom prst="ellipse">
@@ -4301,7 +4301,7 @@
                 </p:nvSpPr>
                 <p:spPr>
                   <a:xfrm>
-                    <a:off x="292388" y="1379394"/>
+                    <a:off x="279326" y="1398987"/>
                     <a:ext cx="47390" cy="171047"/>
                   </a:xfrm>
                   <a:prstGeom prst="rect">
@@ -4342,8 +4342,8 @@
                 </p:txBody>
               </p:sp>
             </p:grpSp>
-            <mc:AlternateContent xmlns:mc="http://schemas.openxmlformats.org/markup-compatibility/2006">
-              <mc:Choice xmlns:a14="http://schemas.microsoft.com/office/drawing/2010/main" Requires="a14">
+            <mc:AlternateContent xmlns:mc="http://schemas.openxmlformats.org/markup-compatibility/2006" xmlns:a14="http://schemas.microsoft.com/office/drawing/2010/main">
+              <mc:Choice Requires="a14">
                 <p:sp>
                   <p:nvSpPr>
                     <p:cNvPr id="198" name="TextBox 197">
@@ -4438,7 +4438,7 @@
                   </p:txBody>
                 </p:sp>
               </mc:Choice>
-              <mc:Fallback>
+              <mc:Fallback xmlns="">
                 <p:sp>
                   <p:nvSpPr>
                     <p:cNvPr id="198" name="TextBox 197">
@@ -4499,9 +4499,9 @@
             <p:grpSpPr>
               <a:xfrm>
                 <a:off x="592540" y="3498497"/>
-                <a:ext cx="1651050" cy="931970"/>
+                <a:ext cx="1651050" cy="971156"/>
                 <a:chOff x="481036" y="4023756"/>
-                <a:chExt cx="1651050" cy="931970"/>
+                <a:chExt cx="1651050" cy="971156"/>
               </a:xfrm>
             </p:grpSpPr>
             <p:grpSp>
@@ -4518,9 +4518,9 @@
               </p:nvGrpSpPr>
               <p:grpSpPr>
                 <a:xfrm>
-                  <a:off x="516273" y="4041326"/>
+                  <a:off x="516273" y="4080512"/>
                   <a:ext cx="914400" cy="914400"/>
-                  <a:chOff x="-250560" y="854703"/>
+                  <a:chOff x="-250560" y="893889"/>
                   <a:chExt cx="914400" cy="914400"/>
                 </a:xfrm>
               </p:grpSpPr>
@@ -4552,7 +4552,7 @@
                 </p:blipFill>
                 <p:spPr>
                   <a:xfrm>
-                    <a:off x="-250560" y="854703"/>
+                    <a:off x="-250560" y="893889"/>
                     <a:ext cx="914400" cy="914400"/>
                   </a:xfrm>
                   <a:prstGeom prst="rect">
@@ -4574,7 +4574,7 @@
                 </p:nvSpPr>
                 <p:spPr>
                   <a:xfrm>
-                    <a:off x="137521" y="1476966"/>
+                    <a:off x="144052" y="1516152"/>
                     <a:ext cx="136306" cy="130428"/>
                   </a:xfrm>
                   <a:prstGeom prst="ellipse">
@@ -4628,8 +4628,8 @@
                 </p:nvSpPr>
                 <p:spPr>
                   <a:xfrm>
-                    <a:off x="180704" y="1357770"/>
-                    <a:ext cx="45719" cy="144545"/>
+                    <a:off x="180704" y="1396956"/>
+                    <a:ext cx="45719" cy="158830"/>
                   </a:xfrm>
                   <a:prstGeom prst="rect">
                     <a:avLst/>
@@ -4669,8 +4669,8 @@
                 </p:txBody>
               </p:sp>
             </p:grpSp>
-            <mc:AlternateContent xmlns:mc="http://schemas.openxmlformats.org/markup-compatibility/2006">
-              <mc:Choice xmlns:a14="http://schemas.microsoft.com/office/drawing/2010/main" Requires="a14">
+            <mc:AlternateContent xmlns:mc="http://schemas.openxmlformats.org/markup-compatibility/2006" xmlns:a14="http://schemas.microsoft.com/office/drawing/2010/main">
+              <mc:Choice Requires="a14">
                 <p:sp>
                   <p:nvSpPr>
                     <p:cNvPr id="204" name="TextBox 203">
@@ -4802,7 +4802,7 @@
                   </p:txBody>
                 </p:sp>
               </mc:Choice>
-              <mc:Fallback>
+              <mc:Fallback xmlns="">
                 <p:sp>
                   <p:nvSpPr>
                     <p:cNvPr id="204" name="TextBox 203">
@@ -4876,7 +4876,7 @@
             </p:blipFill>
             <p:spPr>
               <a:xfrm>
-                <a:off x="1302245" y="3533598"/>
+                <a:off x="1302245" y="3553191"/>
                 <a:ext cx="914400" cy="914400"/>
               </a:xfrm>
               <a:prstGeom prst="rect">
@@ -4898,7 +4898,7 @@
             </p:nvSpPr>
             <p:spPr>
               <a:xfrm>
-                <a:off x="1693403" y="4156259"/>
+                <a:off x="1693403" y="4175852"/>
                 <a:ext cx="136306" cy="130428"/>
               </a:xfrm>
               <a:prstGeom prst="ellipse">
@@ -4952,7 +4952,7 @@
             </p:nvSpPr>
             <p:spPr>
               <a:xfrm>
-                <a:off x="1734185" y="4018139"/>
+                <a:off x="1734185" y="4037732"/>
                 <a:ext cx="45719" cy="144545"/>
               </a:xfrm>
               <a:prstGeom prst="rect">
@@ -5008,7 +5008,7 @@
                 </p:nvSpPr>
                 <p:spPr>
                   <a:xfrm>
-                    <a:off x="1787366" y="3535412"/>
+                    <a:off x="1787366" y="3489695"/>
                     <a:ext cx="627574" cy="462691"/>
                   </a:xfrm>
                   <a:prstGeom prst="rect">
@@ -5142,7 +5142,7 @@
                 </p:nvSpPr>
                 <p:spPr>
                   <a:xfrm>
-                    <a:off x="1787366" y="3535412"/>
+                    <a:off x="1787366" y="3489695"/>
                     <a:ext cx="627574" cy="462691"/>
                   </a:xfrm>
                   <a:prstGeom prst="rect">
@@ -5186,7 +5186,7 @@
                 </p:nvSpPr>
                 <p:spPr>
                   <a:xfrm>
-                    <a:off x="6582746" y="3500299"/>
+                    <a:off x="6582746" y="3480706"/>
                     <a:ext cx="1651050" cy="400110"/>
                   </a:xfrm>
                   <a:prstGeom prst="rect">
@@ -5374,7 +5374,7 @@
                 </p:nvSpPr>
                 <p:spPr>
                   <a:xfrm>
-                    <a:off x="6582746" y="3500299"/>
+                    <a:off x="6582746" y="3480706"/>
                     <a:ext cx="1651050" cy="400110"/>
                   </a:xfrm>
                   <a:prstGeom prst="rect">
@@ -5383,7 +5383,7 @@
                   <a:blipFill>
                     <a:blip r:embed="rId14"/>
                     <a:stretch>
-                      <a:fillRect/>
+                      <a:fillRect b="-3125"/>
                     </a:stretch>
                   </a:blipFill>
                 </p:spPr>
@@ -5418,7 +5418,7 @@
                 </p:nvSpPr>
                 <p:spPr>
                   <a:xfrm>
-                    <a:off x="5486362" y="3472320"/>
+                    <a:off x="5486362" y="3485382"/>
                     <a:ext cx="577101" cy="400110"/>
                   </a:xfrm>
                   <a:prstGeom prst="rect">
@@ -5515,7 +5515,7 @@
                 </p:nvSpPr>
                 <p:spPr>
                   <a:xfrm>
-                    <a:off x="5486362" y="3472320"/>
+                    <a:off x="5486362" y="3485382"/>
                     <a:ext cx="577101" cy="400110"/>
                   </a:xfrm>
                   <a:prstGeom prst="rect">
@@ -5613,7 +5613,7 @@
               </p:nvSpPr>
               <p:spPr>
                 <a:xfrm>
-                  <a:off x="6554728" y="4233314"/>
+                  <a:off x="6577588" y="4233314"/>
                   <a:ext cx="136306" cy="130428"/>
                 </a:xfrm>
                 <a:prstGeom prst="ellipse">
@@ -5667,8 +5667,8 @@
               </p:nvSpPr>
               <p:spPr>
                 <a:xfrm>
-                  <a:off x="6614537" y="4053160"/>
-                  <a:ext cx="47390" cy="171047"/>
+                  <a:off x="6621068" y="4053160"/>
+                  <a:ext cx="45719" cy="273163"/>
                 </a:xfrm>
                 <a:prstGeom prst="rect">
                   <a:avLst/>
@@ -5779,7 +5779,7 @@
               <p:spPr>
                 <a:xfrm>
                   <a:off x="7324488" y="3742459"/>
-                  <a:ext cx="58070" cy="594317"/>
+                  <a:ext cx="45719" cy="594317"/>
                 </a:xfrm>
                 <a:prstGeom prst="rect">
                   <a:avLst/>
@@ -5832,7 +5832,7 @@
               </p:nvSpPr>
               <p:spPr>
                 <a:xfrm>
-                  <a:off x="7279890" y="4206347"/>
+                  <a:off x="7286421" y="4232474"/>
                   <a:ext cx="136306" cy="130428"/>
                 </a:xfrm>
                 <a:prstGeom prst="ellipse">
@@ -5889,7 +5889,7 @@
                 </p:nvSpPr>
                 <p:spPr>
                   <a:xfrm>
-                    <a:off x="5879261" y="3510379"/>
+                    <a:off x="5879261" y="3484255"/>
                     <a:ext cx="914400" cy="400110"/>
                   </a:xfrm>
                   <a:prstGeom prst="rect">
@@ -5975,7 +5975,7 @@
                 </p:nvSpPr>
                 <p:spPr>
                   <a:xfrm>
-                    <a:off x="5879261" y="3510379"/>
+                    <a:off x="5879261" y="3484255"/>
                     <a:ext cx="914400" cy="400110"/>
                   </a:xfrm>
                   <a:prstGeom prst="rect">
@@ -6073,7 +6073,7 @@
               </p:nvSpPr>
               <p:spPr>
                 <a:xfrm>
-                  <a:off x="6554728" y="4233314"/>
+                  <a:off x="6571057" y="4233314"/>
                   <a:ext cx="136306" cy="130428"/>
                 </a:xfrm>
                 <a:prstGeom prst="ellipse">
@@ -6127,8 +6127,8 @@
               </p:nvSpPr>
               <p:spPr>
                 <a:xfrm>
-                  <a:off x="6614537" y="4053160"/>
-                  <a:ext cx="47390" cy="171047"/>
+                  <a:off x="6621068" y="4053159"/>
+                  <a:ext cx="45719" cy="253310"/>
                 </a:xfrm>
                 <a:prstGeom prst="rect">
                   <a:avLst/>
@@ -6705,9 +6705,9 @@
             </p:nvGrpSpPr>
             <p:grpSpPr>
               <a:xfrm>
-                <a:off x="948265" y="6768374"/>
+                <a:off x="948265" y="6761843"/>
                 <a:ext cx="914400" cy="914400"/>
-                <a:chOff x="354581" y="8437983"/>
+                <a:chOff x="354581" y="8431452"/>
                 <a:chExt cx="914400" cy="914400"/>
               </a:xfrm>
             </p:grpSpPr>
@@ -6739,7 +6739,7 @@
               </p:blipFill>
               <p:spPr>
                 <a:xfrm>
-                  <a:off x="354581" y="8437983"/>
+                  <a:off x="354581" y="8431452"/>
                   <a:ext cx="914400" cy="914400"/>
                 </a:xfrm>
                 <a:prstGeom prst="rect">
@@ -6761,7 +6761,7 @@
               </p:nvSpPr>
               <p:spPr>
                 <a:xfrm>
-                  <a:off x="726544" y="9074104"/>
+                  <a:off x="742873" y="9061042"/>
                   <a:ext cx="136306" cy="130428"/>
                 </a:xfrm>
                 <a:prstGeom prst="ellipse">
@@ -6815,7 +6815,7 @@
               </p:nvSpPr>
               <p:spPr>
                 <a:xfrm>
-                  <a:off x="770114" y="8616862"/>
+                  <a:off x="786443" y="8610331"/>
                   <a:ext cx="45719" cy="515672"/>
                 </a:xfrm>
                 <a:prstGeom prst="rect">
@@ -7340,9 +7340,9 @@
             </p:nvGrpSpPr>
             <p:grpSpPr>
               <a:xfrm>
-                <a:off x="1568969" y="6780149"/>
+                <a:off x="1568969" y="6760556"/>
                 <a:ext cx="914400" cy="914400"/>
-                <a:chOff x="799304" y="927459"/>
+                <a:chOff x="799304" y="907866"/>
                 <a:chExt cx="914400" cy="914400"/>
               </a:xfrm>
             </p:grpSpPr>
@@ -7374,7 +7374,7 @@
               </p:blipFill>
               <p:spPr>
                 <a:xfrm>
-                  <a:off x="799304" y="927459"/>
+                  <a:off x="799304" y="907866"/>
                   <a:ext cx="914400" cy="914400"/>
                 </a:xfrm>
                 <a:prstGeom prst="rect">
@@ -7396,7 +7396,7 @@
               </p:nvSpPr>
               <p:spPr>
                 <a:xfrm>
-                  <a:off x="1188784" y="1549678"/>
+                  <a:off x="1188784" y="1530085"/>
                   <a:ext cx="136306" cy="130428"/>
                 </a:xfrm>
                 <a:prstGeom prst="ellipse">
@@ -7450,7 +7450,7 @@
               </p:nvSpPr>
               <p:spPr>
                 <a:xfrm>
-                  <a:off x="1231963" y="1411557"/>
+                  <a:off x="1231963" y="1391964"/>
                   <a:ext cx="45719" cy="144545"/>
                 </a:xfrm>
                 <a:prstGeom prst="rect">
@@ -7507,7 +7507,7 @@
                 </p:nvSpPr>
                 <p:spPr>
                   <a:xfrm>
-                    <a:off x="912243" y="6739938"/>
+                    <a:off x="912243" y="6694221"/>
                     <a:ext cx="1651050" cy="462691"/>
                   </a:xfrm>
                   <a:prstGeom prst="rect">
@@ -7641,7 +7641,7 @@
                 </p:nvSpPr>
                 <p:spPr>
                   <a:xfrm>
-                    <a:off x="912243" y="6739938"/>
+                    <a:off x="912243" y="6694221"/>
                     <a:ext cx="1651050" cy="462691"/>
                   </a:xfrm>
                   <a:prstGeom prst="rect">
@@ -7685,7 +7685,7 @@
                 </p:nvSpPr>
                 <p:spPr>
                   <a:xfrm>
-                    <a:off x="2041820" y="6700795"/>
+                    <a:off x="2041820" y="6687733"/>
                     <a:ext cx="627574" cy="462691"/>
                   </a:xfrm>
                   <a:prstGeom prst="rect">
@@ -7819,7 +7819,7 @@
                 </p:nvSpPr>
                 <p:spPr>
                   <a:xfrm>
-                    <a:off x="2041820" y="6700795"/>
+                    <a:off x="2041820" y="6687733"/>
                     <a:ext cx="627574" cy="462691"/>
                   </a:xfrm>
                   <a:prstGeom prst="rect">
@@ -7847,8 +7847,8 @@
               </p:sp>
             </mc:Fallback>
           </mc:AlternateContent>
-          <mc:AlternateContent xmlns:mc="http://schemas.openxmlformats.org/markup-compatibility/2006">
-            <mc:Choice xmlns:a14="http://schemas.microsoft.com/office/drawing/2010/main" Requires="a14">
+          <mc:AlternateContent xmlns:mc="http://schemas.openxmlformats.org/markup-compatibility/2006" xmlns:a14="http://schemas.microsoft.com/office/drawing/2010/main">
+            <mc:Choice Requires="a14">
               <p:sp>
                 <p:nvSpPr>
                   <p:cNvPr id="35" name="TextBox 34">
@@ -8034,7 +8034,7 @@
                 </p:txBody>
               </p:sp>
             </mc:Choice>
-            <mc:Fallback>
+            <mc:Fallback xmlns="">
               <p:sp>
                 <p:nvSpPr>
                   <p:cNvPr id="35" name="TextBox 34">
@@ -8149,7 +8149,7 @@
               </p:nvSpPr>
               <p:spPr>
                 <a:xfrm>
-                  <a:off x="6554728" y="4233314"/>
+                  <a:off x="6571057" y="4233314"/>
                   <a:ext cx="136306" cy="130428"/>
                 </a:xfrm>
                 <a:prstGeom prst="ellipse">
@@ -8314,8 +8314,8 @@
               </p:nvSpPr>
               <p:spPr>
                 <a:xfrm>
-                  <a:off x="7324488" y="4041031"/>
-                  <a:ext cx="45719" cy="313674"/>
+                  <a:off x="7324488" y="4065349"/>
+                  <a:ext cx="45719" cy="289356"/>
                 </a:xfrm>
                 <a:prstGeom prst="rect">
                   <a:avLst/>
@@ -8368,7 +8368,7 @@
               </p:nvSpPr>
               <p:spPr>
                 <a:xfrm>
-                  <a:off x="7279890" y="4206347"/>
+                  <a:off x="7279890" y="4222676"/>
                   <a:ext cx="136306" cy="130428"/>
                 </a:xfrm>
                 <a:prstGeom prst="ellipse">
@@ -8479,7 +8479,7 @@
               </p:nvSpPr>
               <p:spPr>
                 <a:xfrm>
-                  <a:off x="6554728" y="4233314"/>
+                  <a:off x="6571057" y="4233314"/>
                   <a:ext cx="136306" cy="130428"/>
                 </a:xfrm>
                 <a:prstGeom prst="ellipse">
@@ -8590,7 +8590,7 @@
                 </p:nvSpPr>
                 <p:spPr>
                   <a:xfrm>
-                    <a:off x="5741480" y="6730327"/>
+                    <a:off x="5741480" y="6684610"/>
                     <a:ext cx="577101" cy="400110"/>
                   </a:xfrm>
                   <a:prstGeom prst="rect">
@@ -8687,7 +8687,7 @@
                 </p:nvSpPr>
                 <p:spPr>
                   <a:xfrm>
-                    <a:off x="5741480" y="6730327"/>
+                    <a:off x="5741480" y="6684610"/>
                     <a:ext cx="577101" cy="400110"/>
                   </a:xfrm>
                   <a:prstGeom prst="rect">
@@ -8696,7 +8696,7 @@
                   <a:blipFill>
                     <a:blip r:embed="rId21"/>
                     <a:stretch>
-                      <a:fillRect b="-3125"/>
+                      <a:fillRect/>
                     </a:stretch>
                   </a:blipFill>
                 </p:spPr>
@@ -8731,7 +8731,7 @@
                 </p:nvSpPr>
                 <p:spPr>
                   <a:xfrm>
-                    <a:off x="6152308" y="6750457"/>
+                    <a:off x="6124598" y="6685145"/>
                     <a:ext cx="914400" cy="400110"/>
                   </a:xfrm>
                   <a:prstGeom prst="rect">
@@ -8817,7 +8817,7 @@
                 </p:nvSpPr>
                 <p:spPr>
                   <a:xfrm>
-                    <a:off x="6152308" y="6750457"/>
+                    <a:off x="6124598" y="6685145"/>
                     <a:ext cx="914400" cy="400110"/>
                   </a:xfrm>
                   <a:prstGeom prst="rect">
@@ -8859,9 +8859,9 @@
             </p:nvGrpSpPr>
             <p:grpSpPr>
               <a:xfrm>
-                <a:off x="404766" y="6770794"/>
+                <a:off x="404766" y="6757732"/>
                 <a:ext cx="914400" cy="914400"/>
-                <a:chOff x="341123" y="8486622"/>
+                <a:chOff x="341123" y="8473560"/>
                 <a:chExt cx="914400" cy="914400"/>
               </a:xfrm>
             </p:grpSpPr>
@@ -8893,7 +8893,7 @@
               </p:blipFill>
               <p:spPr>
                 <a:xfrm>
-                  <a:off x="341123" y="8486622"/>
+                  <a:off x="341123" y="8473560"/>
                   <a:ext cx="914400" cy="914400"/>
                 </a:xfrm>
                 <a:prstGeom prst="rect">
@@ -8915,7 +8915,7 @@
               </p:nvSpPr>
               <p:spPr>
                 <a:xfrm>
-                  <a:off x="728075" y="9112267"/>
+                  <a:off x="734606" y="9099205"/>
                   <a:ext cx="136306" cy="130428"/>
                 </a:xfrm>
                 <a:prstGeom prst="ellipse">
@@ -8969,7 +8969,7 @@
               </p:nvSpPr>
               <p:spPr>
                 <a:xfrm>
-                  <a:off x="770112" y="8616862"/>
+                  <a:off x="776643" y="8603800"/>
                   <a:ext cx="45719" cy="515672"/>
                 </a:xfrm>
                 <a:prstGeom prst="rect">
@@ -9026,7 +9026,7 @@
                 </p:nvSpPr>
                 <p:spPr>
                   <a:xfrm>
-                    <a:off x="836345" y="6739938"/>
+                    <a:off x="836345" y="6681159"/>
                     <a:ext cx="577101" cy="400110"/>
                   </a:xfrm>
                   <a:prstGeom prst="rect">
@@ -9123,7 +9123,7 @@
                 </p:nvSpPr>
                 <p:spPr>
                   <a:xfrm>
-                    <a:off x="836345" y="6739938"/>
+                    <a:off x="836345" y="6681159"/>
                     <a:ext cx="577101" cy="400110"/>
                   </a:xfrm>
                   <a:prstGeom prst="rect">
@@ -9132,7 +9132,7 @@
                   <a:blipFill>
                     <a:blip r:embed="rId23"/>
                     <a:stretch>
-                      <a:fillRect/>
+                      <a:fillRect b="-3125"/>
                     </a:stretch>
                   </a:blipFill>
                 </p:spPr>
@@ -11090,8 +11090,8 @@
                   </a:p>
                 </p:txBody>
               </p:sp>
-              <mc:AlternateContent xmlns:mc="http://schemas.openxmlformats.org/markup-compatibility/2006">
-                <mc:Choice xmlns:a14="http://schemas.microsoft.com/office/drawing/2010/main" Requires="a14">
+              <mc:AlternateContent xmlns:mc="http://schemas.openxmlformats.org/markup-compatibility/2006" xmlns:a14="http://schemas.microsoft.com/office/drawing/2010/main">
+                <mc:Choice Requires="a14">
                   <p:sp>
                     <p:nvSpPr>
                       <p:cNvPr id="120" name="Rectangle 119">
@@ -11216,7 +11216,7 @@
                     </p:txBody>
                   </p:sp>
                 </mc:Choice>
-                <mc:Fallback>
+                <mc:Fallback xmlns="">
                   <p:sp>
                     <p:nvSpPr>
                       <p:cNvPr id="120" name="Rectangle 119">
@@ -11353,8 +11353,8 @@
                   </a:fontRef>
                 </p:style>
               </p:cxnSp>
-              <mc:AlternateContent xmlns:mc="http://schemas.openxmlformats.org/markup-compatibility/2006">
-                <mc:Choice xmlns:a14="http://schemas.microsoft.com/office/drawing/2010/main" Requires="a14">
+              <mc:AlternateContent xmlns:mc="http://schemas.openxmlformats.org/markup-compatibility/2006" xmlns:a14="http://schemas.microsoft.com/office/drawing/2010/main">
+                <mc:Choice Requires="a14">
                   <p:sp>
                     <p:nvSpPr>
                       <p:cNvPr id="125" name="Rectangle 124">
@@ -11477,7 +11477,7 @@
                     </p:txBody>
                   </p:sp>
                 </mc:Choice>
-                <mc:Fallback>
+                <mc:Fallback xmlns="">
                   <p:sp>
                     <p:nvSpPr>
                       <p:cNvPr id="125" name="Rectangle 124">
@@ -12312,8 +12312,8 @@
                 </p:sp>
               </mc:Fallback>
             </mc:AlternateContent>
-            <mc:AlternateContent xmlns:mc="http://schemas.openxmlformats.org/markup-compatibility/2006">
-              <mc:Choice xmlns:a14="http://schemas.microsoft.com/office/drawing/2010/main" Requires="a14">
+            <mc:AlternateContent xmlns:mc="http://schemas.openxmlformats.org/markup-compatibility/2006" xmlns:a14="http://schemas.microsoft.com/office/drawing/2010/main">
+              <mc:Choice Requires="a14">
                 <p:sp>
                   <p:nvSpPr>
                     <p:cNvPr id="98" name="Rectangle 3">
@@ -12534,7 +12534,7 @@
                   </p:txBody>
                 </p:sp>
               </mc:Choice>
-              <mc:Fallback>
+              <mc:Fallback xmlns="">
                 <p:sp>
                   <p:nvSpPr>
                     <p:cNvPr id="98" name="Rectangle 3">
@@ -12611,8 +12611,8 @@
                 </p:sp>
               </mc:Fallback>
             </mc:AlternateContent>
-            <mc:AlternateContent xmlns:mc="http://schemas.openxmlformats.org/markup-compatibility/2006">
-              <mc:Choice xmlns:a14="http://schemas.microsoft.com/office/drawing/2010/main" Requires="a14">
+            <mc:AlternateContent xmlns:mc="http://schemas.openxmlformats.org/markup-compatibility/2006" xmlns:a14="http://schemas.microsoft.com/office/drawing/2010/main">
+              <mc:Choice Requires="a14">
                 <p:sp>
                   <p:nvSpPr>
                     <p:cNvPr id="99" name="Rectangle 98">
@@ -13184,7 +13184,7 @@
                   </p:txBody>
                 </p:sp>
               </mc:Choice>
-              <mc:Fallback>
+              <mc:Fallback xmlns="">
                 <p:sp>
                   <p:nvSpPr>
                     <p:cNvPr id="99" name="Rectangle 98">

</xml_diff>